<commit_message>
Add QR code and link to slides
</commit_message>
<xml_diff>
--- a/2025/NDC TechTown/CMake — From Basics to Building.pptx
+++ b/2025/NDC TechTown/CMake — From Basics to Building.pptx
@@ -42741,12 +42741,23 @@
             <p:ph type="body" sz="quarter" idx="16"/>
           </p:nvPr>
         </p:nvSpPr>
-        <p:spPr/>
+        <p:spPr>
+          <a:xfrm>
+            <a:off x="9250681" y="5339080"/>
+            <a:ext cx="4373880" cy="523240"/>
+          </a:xfrm>
+        </p:spPr>
         <p:txBody>
           <a:bodyPr/>
           <a:lstStyle/>
           <a:p>
-            <a:endParaRPr lang="en-US"/>
+            <a:r>
+              <a:rPr lang="en-US" dirty="0">
+                <a:hlinkClick r:id="rId2"/>
+              </a:rPr>
+              <a:t>https://github.com/Angew/talks/tree/master/2025/NDC%20TechTown</a:t>
+            </a:r>
+            <a:endParaRPr lang="en-US" dirty="0"/>
           </a:p>
         </p:txBody>
       </p:sp>
@@ -42810,6 +42821,36 @@
           </a:p>
         </p:txBody>
       </p:sp>
+      <p:pic>
+        <p:nvPicPr>
+          <p:cNvPr id="8" name="Picture 7" descr="https://github.com/Angew/talks/tree/master/2025/NDC%20TechTown">
+            <a:extLst>
+              <a:ext uri="{FF2B5EF4-FFF2-40B4-BE49-F238E27FC236}">
+                <a16:creationId xmlns:a16="http://schemas.microsoft.com/office/drawing/2014/main" id="{8D632ED0-4665-B492-245D-AC2C072B8013}"/>
+              </a:ext>
+            </a:extLst>
+          </p:cNvPr>
+          <p:cNvPicPr>
+            <a:picLocks noChangeAspect="1"/>
+          </p:cNvPicPr>
+          <p:nvPr/>
+        </p:nvPicPr>
+        <p:blipFill>
+          <a:blip r:embed="rId3"/>
+          <a:stretch>
+            <a:fillRect/>
+          </a:stretch>
+        </p:blipFill>
+        <p:spPr>
+          <a:xfrm>
+            <a:off x="9708834" y="1662430"/>
+            <a:ext cx="3457574" cy="3457574"/>
+          </a:xfrm>
+          <a:prstGeom prst="rect">
+            <a:avLst/>
+          </a:prstGeom>
+        </p:spPr>
+      </p:pic>
     </p:spTree>
     <p:extLst>
       <p:ext uri="{BB962C8B-B14F-4D97-AF65-F5344CB8AC3E}">
@@ -50171,18 +50212,18 @@
 </file>
 
 <file path=customXml/item2.xml><?xml version="1.0" encoding="utf-8"?>
+<p:properties xmlns:p="http://schemas.microsoft.com/office/2006/metadata/properties" xmlns:xsi="http://www.w3.org/2001/XMLSchema-instance" xmlns:pc="http://schemas.microsoft.com/office/infopath/2007/PartnerControls">
+  <documentManagement/>
+</p:properties>
+</file>
+
+<file path=customXml/item3.xml><?xml version="1.0" encoding="utf-8"?>
 <?mso-contentType ?>
 <FormTemplates xmlns="http://schemas.microsoft.com/sharepoint/v3/contenttype/forms">
   <Display>DocumentLibraryForm</Display>
   <Edit>DocumentLibraryForm</Edit>
   <New>DocumentLibraryForm</New>
 </FormTemplates>
-</file>
-
-<file path=customXml/item3.xml><?xml version="1.0" encoding="utf-8"?>
-<p:properties xmlns:p="http://schemas.microsoft.com/office/2006/metadata/properties" xmlns:xsi="http://www.w3.org/2001/XMLSchema-instance" xmlns:pc="http://schemas.microsoft.com/office/infopath/2007/PartnerControls">
-  <documentManagement/>
-</p:properties>
 </file>
 
 <file path=customXml/itemProps1.xml><?xml version="1.0" encoding="utf-8"?>
@@ -50202,14 +50243,6 @@
 </file>
 
 <file path=customXml/itemProps2.xml><?xml version="1.0" encoding="utf-8"?>
-<ds:datastoreItem xmlns:ds="http://schemas.openxmlformats.org/officeDocument/2006/customXml" ds:itemID="{554C8614-33A7-414F-AC00-003995D31299}">
-  <ds:schemaRefs>
-    <ds:schemaRef ds:uri="http://schemas.microsoft.com/sharepoint/v3/contenttype/forms"/>
-  </ds:schemaRefs>
-</ds:datastoreItem>
-</file>
-
-<file path=customXml/itemProps3.xml><?xml version="1.0" encoding="utf-8"?>
 <ds:datastoreItem xmlns:ds="http://schemas.openxmlformats.org/officeDocument/2006/customXml" ds:itemID="{456C20D6-A487-4686-979F-5311C7674B55}">
   <ds:schemaRefs>
     <ds:schemaRef ds:uri="http://schemas.microsoft.com/office/2006/documentManagement/types"/>
@@ -50225,4 +50258,12 @@
     <ds:schemaRef ds:uri="5ca20806-8183-4b03-997e-4d228571ca18"/>
   </ds:schemaRefs>
 </ds:datastoreItem>
+</file>
+
+<file path=customXml/itemProps3.xml><?xml version="1.0" encoding="utf-8"?>
+<ds:datastoreItem xmlns:ds="http://schemas.openxmlformats.org/officeDocument/2006/customXml" ds:itemID="{554C8614-33A7-414F-AC00-003995D31299}">
+  <ds:schemaRefs>
+    <ds:schemaRef ds:uri="http://schemas.microsoft.com/sharepoint/v3/contenttype/forms"/>
+  </ds:schemaRefs>
+</ds:datastoreItem>
 </file>
</xml_diff>